<commit_message>
Advance Data Science updated
</commit_message>
<xml_diff>
--- a/CS 6675 - Advance Data Science/Practicum/Presentation.pptx
+++ b/CS 6675 - Advance Data Science/Practicum/Presentation.pptx
@@ -9,7 +9,11 @@
     <p:sldId id="256" r:id="rId3"/>
     <p:sldId id="258" r:id="rId4"/>
     <p:sldId id="259" r:id="rId5"/>
-    <p:sldId id="260" r:id="rId6"/>
+    <p:sldId id="264" r:id="rId6"/>
+    <p:sldId id="260" r:id="rId7"/>
+    <p:sldId id="261" r:id="rId8"/>
+    <p:sldId id="263" r:id="rId9"/>
+    <p:sldId id="262" r:id="rId10"/>
   </p:sldIdLst>
   <p:sldSz cx="12192000" cy="6858000"/>
   <p:notesSz cx="6858000" cy="9144000"/>
@@ -245,7 +249,7 @@
           <a:p>
             <a:fld id="{5855632B-F18C-4824-BF1E-AC92AA108056}" type="datetimeFigureOut">
               <a:rPr lang="en-US" smtClean="0"/>
-              <a:t>2/9/2017</a:t>
+              <a:t>2/14/2017</a:t>
             </a:fld>
             <a:endParaRPr lang="en-US"/>
           </a:p>
@@ -413,7 +417,7 @@
           <a:p>
             <a:fld id="{5855632B-F18C-4824-BF1E-AC92AA108056}" type="datetimeFigureOut">
               <a:rPr lang="en-US" smtClean="0"/>
-              <a:t>2/9/2017</a:t>
+              <a:t>2/14/2017</a:t>
             </a:fld>
             <a:endParaRPr lang="en-US"/>
           </a:p>
@@ -591,7 +595,7 @@
           <a:p>
             <a:fld id="{5855632B-F18C-4824-BF1E-AC92AA108056}" type="datetimeFigureOut">
               <a:rPr lang="en-US" smtClean="0"/>
-              <a:t>2/9/2017</a:t>
+              <a:t>2/14/2017</a:t>
             </a:fld>
             <a:endParaRPr lang="en-US"/>
           </a:p>
@@ -759,7 +763,7 @@
           <a:p>
             <a:fld id="{5855632B-F18C-4824-BF1E-AC92AA108056}" type="datetimeFigureOut">
               <a:rPr lang="en-US" smtClean="0"/>
-              <a:t>2/9/2017</a:t>
+              <a:t>2/14/2017</a:t>
             </a:fld>
             <a:endParaRPr lang="en-US"/>
           </a:p>
@@ -1004,7 +1008,7 @@
           <a:p>
             <a:fld id="{5855632B-F18C-4824-BF1E-AC92AA108056}" type="datetimeFigureOut">
               <a:rPr lang="en-US" smtClean="0"/>
-              <a:t>2/9/2017</a:t>
+              <a:t>2/14/2017</a:t>
             </a:fld>
             <a:endParaRPr lang="en-US"/>
           </a:p>
@@ -1233,7 +1237,7 @@
           <a:p>
             <a:fld id="{5855632B-F18C-4824-BF1E-AC92AA108056}" type="datetimeFigureOut">
               <a:rPr lang="en-US" smtClean="0"/>
-              <a:t>2/9/2017</a:t>
+              <a:t>2/14/2017</a:t>
             </a:fld>
             <a:endParaRPr lang="en-US"/>
           </a:p>
@@ -1597,7 +1601,7 @@
           <a:p>
             <a:fld id="{5855632B-F18C-4824-BF1E-AC92AA108056}" type="datetimeFigureOut">
               <a:rPr lang="en-US" smtClean="0"/>
-              <a:t>2/9/2017</a:t>
+              <a:t>2/14/2017</a:t>
             </a:fld>
             <a:endParaRPr lang="en-US"/>
           </a:p>
@@ -1714,7 +1718,7 @@
           <a:p>
             <a:fld id="{5855632B-F18C-4824-BF1E-AC92AA108056}" type="datetimeFigureOut">
               <a:rPr lang="en-US" smtClean="0"/>
-              <a:t>2/9/2017</a:t>
+              <a:t>2/14/2017</a:t>
             </a:fld>
             <a:endParaRPr lang="en-US"/>
           </a:p>
@@ -1809,7 +1813,7 @@
           <a:p>
             <a:fld id="{5855632B-F18C-4824-BF1E-AC92AA108056}" type="datetimeFigureOut">
               <a:rPr lang="en-US" smtClean="0"/>
-              <a:t>2/9/2017</a:t>
+              <a:t>2/14/2017</a:t>
             </a:fld>
             <a:endParaRPr lang="en-US"/>
           </a:p>
@@ -2084,7 +2088,7 @@
           <a:p>
             <a:fld id="{5855632B-F18C-4824-BF1E-AC92AA108056}" type="datetimeFigureOut">
               <a:rPr lang="en-US" smtClean="0"/>
-              <a:t>2/9/2017</a:t>
+              <a:t>2/14/2017</a:t>
             </a:fld>
             <a:endParaRPr lang="en-US"/>
           </a:p>
@@ -2336,7 +2340,7 @@
           <a:p>
             <a:fld id="{5855632B-F18C-4824-BF1E-AC92AA108056}" type="datetimeFigureOut">
               <a:rPr lang="en-US" smtClean="0"/>
-              <a:t>2/9/2017</a:t>
+              <a:t>2/14/2017</a:t>
             </a:fld>
             <a:endParaRPr lang="en-US"/>
           </a:p>
@@ -2547,7 +2551,7 @@
           <a:p>
             <a:fld id="{5855632B-F18C-4824-BF1E-AC92AA108056}" type="datetimeFigureOut">
               <a:rPr lang="en-US" smtClean="0"/>
-              <a:t>2/9/2017</a:t>
+              <a:t>2/14/2017</a:t>
             </a:fld>
             <a:endParaRPr lang="en-US"/>
           </a:p>
@@ -3904,13 +3908,8 @@
           <a:p>
             <a:r>
               <a:rPr lang="en-US" dirty="0"/>
-              <a:t>Choice of Photos are type </a:t>
-            </a:r>
-            <a:r>
-              <a:rPr lang="en-US" dirty="0"/>
-              <a:t>of behavior associated at least in part with personality expressed by five factor model</a:t>
-            </a:r>
-            <a:endParaRPr lang="en-US" dirty="0"/>
+              <a:t>Choice of Photos are type of behavior associated at least in part with personality expressed by five factor model</a:t>
+            </a:r>
           </a:p>
           <a:p>
             <a:r>
@@ -3919,13 +3918,8 @@
             </a:r>
             <a:r>
               <a:rPr lang="en-US" dirty="0"/>
-              <a:t> Big Five – </a:t>
-            </a:r>
-            <a:r>
-              <a:rPr lang="en-US" dirty="0"/>
-              <a:t>consisting of openness to experience, conscientiousness, extraversion, agreeableness and neuroticism</a:t>
-            </a:r>
-            <a:endParaRPr lang="en-US" dirty="0"/>
+              <a:t> Big Five – consisting of openness to experience, conscientiousness, extraversion, agreeableness and neuroticism</a:t>
+            </a:r>
           </a:p>
         </p:txBody>
       </p:sp>
@@ -3981,20 +3975,98 @@
           </a:p>
         </p:txBody>
       </p:sp>
-      <p:sp>
-        <p:nvSpPr>
-          <p:cNvPr id="3" name="Content Placeholder 2"/>
-          <p:cNvSpPr>
-            <a:spLocks noGrp="1"/>
-          </p:cNvSpPr>
+      <p:pic>
+        <p:nvPicPr>
+          <p:cNvPr id="4" name="Content Placeholder 3"/>
+          <p:cNvPicPr>
+            <a:picLocks noGrp="1" noChangeAspect="1"/>
+          </p:cNvPicPr>
           <p:nvPr>
             <p:ph idx="1"/>
           </p:nvPr>
-        </p:nvSpPr>
+        </p:nvPicPr>
+        <p:blipFill>
+          <a:blip r:embed="rId2"/>
+          <a:stretch>
+            <a:fillRect/>
+          </a:stretch>
+        </p:blipFill>
         <p:spPr>
           <a:xfrm>
-            <a:off x="838200" y="1842443"/>
-            <a:ext cx="10515600" cy="4626069"/>
+            <a:off x="1846728" y="1949261"/>
+            <a:ext cx="7655859" cy="4043791"/>
+          </a:xfrm>
+          <a:prstGeom prst="rect">
+            <a:avLst/>
+          </a:prstGeom>
+        </p:spPr>
+      </p:pic>
+    </p:spTree>
+    <p:extLst>
+      <p:ext uri="{BB962C8B-B14F-4D97-AF65-F5344CB8AC3E}">
+        <p14:creationId xmlns:p14="http://schemas.microsoft.com/office/powerpoint/2010/main" val="2413834453"/>
+      </p:ext>
+    </p:extLst>
+  </p:cSld>
+  <p:clrMapOvr>
+    <a:masterClrMapping/>
+  </p:clrMapOvr>
+</p:sld>
+</file>
+
+<file path=ppt/slides/slide6.xml><?xml version="1.0" encoding="utf-8"?>
+<p:sld xmlns:a="http://schemas.openxmlformats.org/drawingml/2006/main" xmlns:r="http://schemas.openxmlformats.org/officeDocument/2006/relationships" xmlns:p="http://schemas.openxmlformats.org/presentationml/2006/main">
+  <p:cSld>
+    <p:spTree>
+      <p:nvGrpSpPr>
+        <p:cNvPr id="1" name=""/>
+        <p:cNvGrpSpPr/>
+        <p:nvPr/>
+      </p:nvGrpSpPr>
+      <p:grpSpPr>
+        <a:xfrm>
+          <a:off x="0" y="0"/>
+          <a:ext cx="0" cy="0"/>
+          <a:chOff x="0" y="0"/>
+          <a:chExt cx="0" cy="0"/>
+        </a:xfrm>
+      </p:grpSpPr>
+      <p:sp>
+        <p:nvSpPr>
+          <p:cNvPr id="2" name="Title 1"/>
+          <p:cNvSpPr>
+            <a:spLocks noGrp="1"/>
+          </p:cNvSpPr>
+          <p:nvPr>
+            <p:ph type="title"/>
+          </p:nvPr>
+        </p:nvSpPr>
+        <p:spPr/>
+        <p:txBody>
+          <a:bodyPr/>
+          <a:lstStyle/>
+          <a:p>
+            <a:r>
+              <a:rPr lang="en-US" b="1" dirty="0"/>
+              <a:t>Relation between Personality and Picture</a:t>
+            </a:r>
+          </a:p>
+        </p:txBody>
+      </p:sp>
+      <p:sp>
+        <p:nvSpPr>
+          <p:cNvPr id="3" name="Content Placeholder 2"/>
+          <p:cNvSpPr>
+            <a:spLocks noGrp="1"/>
+          </p:cNvSpPr>
+          <p:nvPr>
+            <p:ph idx="1"/>
+          </p:nvPr>
+        </p:nvSpPr>
+        <p:spPr>
+          <a:xfrm>
+            <a:off x="838200" y="1627283"/>
+            <a:ext cx="10515600" cy="5042458"/>
           </a:xfrm>
         </p:spPr>
         <p:txBody>
@@ -4032,6 +4104,46 @@
               <a:rPr lang="en-US" dirty="0"/>
               <a:t>Use picture involving other people or the once that express more positive emotions</a:t>
             </a:r>
+          </a:p>
+          <a:p>
+            <a:r>
+              <a:rPr lang="en-US" dirty="0"/>
+              <a:t>may be more inclined to choose unconventional images and poses, as a general inclination of this type of people for art and novelty.</a:t>
+            </a:r>
+            <a:endParaRPr lang="en-US" dirty="0"/>
+          </a:p>
+          <a:p>
+            <a:r>
+              <a:rPr lang="en-US" dirty="0"/>
+              <a:t>Conscientiousness</a:t>
+            </a:r>
+          </a:p>
+          <a:p>
+            <a:pPr lvl="1"/>
+            <a:r>
+              <a:rPr lang="en-US" dirty="0"/>
+              <a:t>More orderly</a:t>
+            </a:r>
+          </a:p>
+          <a:p>
+            <a:pPr lvl="1"/>
+            <a:r>
+              <a:rPr lang="en-US" dirty="0"/>
+              <a:t>Prefer planned behavior</a:t>
+            </a:r>
+          </a:p>
+          <a:p>
+            <a:r>
+              <a:rPr lang="en-US" dirty="0"/>
+              <a:t>Use frontal photography of themselves</a:t>
+            </a:r>
+          </a:p>
+          <a:p>
+            <a:r>
+              <a:rPr lang="en-US" dirty="0"/>
+              <a:t>Neuroticism is associated with negative emotions, which could also be reflected through users choices of profile images</a:t>
+            </a:r>
+            <a:endParaRPr lang="en-US" dirty="0"/>
           </a:p>
         </p:txBody>
       </p:sp>
@@ -4039,6 +4151,707 @@
     <p:extLst>
       <p:ext uri="{BB962C8B-B14F-4D97-AF65-F5344CB8AC3E}">
         <p14:creationId xmlns:p14="http://schemas.microsoft.com/office/powerpoint/2010/main" val="1613203419"/>
+      </p:ext>
+    </p:extLst>
+  </p:cSld>
+  <p:clrMapOvr>
+    <a:masterClrMapping/>
+  </p:clrMapOvr>
+</p:sld>
+</file>
+
+<file path=ppt/slides/slide7.xml><?xml version="1.0" encoding="utf-8"?>
+<p:sld xmlns:a="http://schemas.openxmlformats.org/drawingml/2006/main" xmlns:r="http://schemas.openxmlformats.org/officeDocument/2006/relationships" xmlns:p="http://schemas.openxmlformats.org/presentationml/2006/main">
+  <p:cSld>
+    <p:spTree>
+      <p:nvGrpSpPr>
+        <p:cNvPr id="1" name=""/>
+        <p:cNvGrpSpPr/>
+        <p:nvPr/>
+      </p:nvGrpSpPr>
+      <p:grpSpPr>
+        <a:xfrm>
+          <a:off x="0" y="0"/>
+          <a:ext cx="0" cy="0"/>
+          <a:chOff x="0" y="0"/>
+          <a:chExt cx="0" cy="0"/>
+        </a:xfrm>
+      </p:grpSpPr>
+      <p:sp>
+        <p:nvSpPr>
+          <p:cNvPr id="2" name="Title 1"/>
+          <p:cNvSpPr>
+            <a:spLocks noGrp="1"/>
+          </p:cNvSpPr>
+          <p:nvPr>
+            <p:ph type="title"/>
+          </p:nvPr>
+        </p:nvSpPr>
+        <p:spPr/>
+        <p:txBody>
+          <a:bodyPr/>
+          <a:lstStyle/>
+          <a:p>
+            <a:r>
+              <a:rPr lang="en-US" b="1" dirty="0"/>
+              <a:t>Features</a:t>
+            </a:r>
+          </a:p>
+        </p:txBody>
+      </p:sp>
+      <p:sp>
+        <p:nvSpPr>
+          <p:cNvPr id="3" name="Content Placeholder 2"/>
+          <p:cNvSpPr>
+            <a:spLocks noGrp="1"/>
+          </p:cNvSpPr>
+          <p:nvPr>
+            <p:ph idx="1"/>
+          </p:nvPr>
+        </p:nvSpPr>
+        <p:spPr>
+          <a:xfrm>
+            <a:off x="838200" y="1775013"/>
+            <a:ext cx="10515600" cy="1201269"/>
+          </a:xfrm>
+        </p:spPr>
+        <p:txBody>
+          <a:bodyPr/>
+          <a:lstStyle/>
+          <a:p>
+            <a:r>
+              <a:rPr lang="en-US" dirty="0"/>
+              <a:t>Colors, aesthetics, facial presentation, emotions</a:t>
+            </a:r>
+          </a:p>
+          <a:p>
+            <a:r>
+              <a:rPr lang="en-US" dirty="0"/>
+              <a:t>Compare features with Big Five model.</a:t>
+            </a:r>
+          </a:p>
+        </p:txBody>
+      </p:sp>
+      <p:sp>
+        <p:nvSpPr>
+          <p:cNvPr id="4" name="Title 1"/>
+          <p:cNvSpPr txBox="1">
+            <a:spLocks/>
+          </p:cNvSpPr>
+          <p:nvPr/>
+        </p:nvSpPr>
+        <p:spPr>
+          <a:xfrm>
+            <a:off x="838200" y="2973860"/>
+            <a:ext cx="10515600" cy="1176798"/>
+          </a:xfrm>
+          <a:prstGeom prst="rect">
+            <a:avLst/>
+          </a:prstGeom>
+        </p:spPr>
+        <p:txBody>
+          <a:bodyPr vert="horz" lIns="91440" tIns="45720" rIns="91440" bIns="45720" rtlCol="0" anchor="ctr">
+            <a:normAutofit/>
+          </a:bodyPr>
+          <a:lstStyle>
+            <a:lvl1pPr algn="l" defTabSz="914400" rtl="0" eaLnBrk="1" latinLnBrk="0" hangingPunct="1">
+              <a:lnSpc>
+                <a:spcPct val="90000"/>
+              </a:lnSpc>
+              <a:spcBef>
+                <a:spcPct val="0"/>
+              </a:spcBef>
+              <a:buNone/>
+              <a:defRPr sz="4400" kern="1200">
+                <a:solidFill>
+                  <a:schemeClr val="tx1"/>
+                </a:solidFill>
+                <a:latin typeface="+mj-lt"/>
+                <a:ea typeface="+mj-ea"/>
+                <a:cs typeface="+mj-cs"/>
+              </a:defRPr>
+            </a:lvl1pPr>
+          </a:lstStyle>
+          <a:p>
+            <a:r>
+              <a:rPr lang="en-US" b="1" dirty="0"/>
+              <a:t>Previous studies conclusion</a:t>
+            </a:r>
+          </a:p>
+        </p:txBody>
+      </p:sp>
+      <p:sp>
+        <p:nvSpPr>
+          <p:cNvPr id="5" name="Content Placeholder 2"/>
+          <p:cNvSpPr txBox="1">
+            <a:spLocks/>
+          </p:cNvSpPr>
+          <p:nvPr/>
+        </p:nvSpPr>
+        <p:spPr>
+          <a:xfrm>
+            <a:off x="820270" y="4204453"/>
+            <a:ext cx="10515600" cy="2034981"/>
+          </a:xfrm>
+          <a:prstGeom prst="rect">
+            <a:avLst/>
+          </a:prstGeom>
+        </p:spPr>
+        <p:txBody>
+          <a:bodyPr vert="horz" lIns="91440" tIns="45720" rIns="91440" bIns="45720" rtlCol="0">
+            <a:normAutofit fontScale="92500" lnSpcReduction="20000"/>
+          </a:bodyPr>
+          <a:lstStyle>
+            <a:lvl1pPr marL="228600" indent="-228600" algn="l" defTabSz="914400" rtl="0" eaLnBrk="1" latinLnBrk="0" hangingPunct="1">
+              <a:lnSpc>
+                <a:spcPct val="90000"/>
+              </a:lnSpc>
+              <a:spcBef>
+                <a:spcPts val="1000"/>
+              </a:spcBef>
+              <a:buFont typeface="Arial" panose="020B0604020202020204" pitchFamily="34" charset="0"/>
+              <a:buChar char="•"/>
+              <a:defRPr sz="2800" kern="1200">
+                <a:solidFill>
+                  <a:schemeClr val="tx1"/>
+                </a:solidFill>
+                <a:latin typeface="+mn-lt"/>
+                <a:ea typeface="+mn-ea"/>
+                <a:cs typeface="+mn-cs"/>
+              </a:defRPr>
+            </a:lvl1pPr>
+            <a:lvl2pPr marL="685800" indent="-228600" algn="l" defTabSz="914400" rtl="0" eaLnBrk="1" latinLnBrk="0" hangingPunct="1">
+              <a:lnSpc>
+                <a:spcPct val="90000"/>
+              </a:lnSpc>
+              <a:spcBef>
+                <a:spcPts val="500"/>
+              </a:spcBef>
+              <a:buFont typeface="Arial" panose="020B0604020202020204" pitchFamily="34" charset="0"/>
+              <a:buChar char="•"/>
+              <a:defRPr sz="2400" kern="1200">
+                <a:solidFill>
+                  <a:schemeClr val="tx1"/>
+                </a:solidFill>
+                <a:latin typeface="+mn-lt"/>
+                <a:ea typeface="+mn-ea"/>
+                <a:cs typeface="+mn-cs"/>
+              </a:defRPr>
+            </a:lvl2pPr>
+            <a:lvl3pPr marL="1143000" indent="-228600" algn="l" defTabSz="914400" rtl="0" eaLnBrk="1" latinLnBrk="0" hangingPunct="1">
+              <a:lnSpc>
+                <a:spcPct val="90000"/>
+              </a:lnSpc>
+              <a:spcBef>
+                <a:spcPts val="500"/>
+              </a:spcBef>
+              <a:buFont typeface="Arial" panose="020B0604020202020204" pitchFamily="34" charset="0"/>
+              <a:buChar char="•"/>
+              <a:defRPr sz="2000" kern="1200">
+                <a:solidFill>
+                  <a:schemeClr val="tx1"/>
+                </a:solidFill>
+                <a:latin typeface="+mn-lt"/>
+                <a:ea typeface="+mn-ea"/>
+                <a:cs typeface="+mn-cs"/>
+              </a:defRPr>
+            </a:lvl3pPr>
+            <a:lvl4pPr marL="1600200" indent="-228600" algn="l" defTabSz="914400" rtl="0" eaLnBrk="1" latinLnBrk="0" hangingPunct="1">
+              <a:lnSpc>
+                <a:spcPct val="90000"/>
+              </a:lnSpc>
+              <a:spcBef>
+                <a:spcPts val="500"/>
+              </a:spcBef>
+              <a:buFont typeface="Arial" panose="020B0604020202020204" pitchFamily="34" charset="0"/>
+              <a:buChar char="•"/>
+              <a:defRPr sz="1800" kern="1200">
+                <a:solidFill>
+                  <a:schemeClr val="tx1"/>
+                </a:solidFill>
+                <a:latin typeface="+mn-lt"/>
+                <a:ea typeface="+mn-ea"/>
+                <a:cs typeface="+mn-cs"/>
+              </a:defRPr>
+            </a:lvl4pPr>
+            <a:lvl5pPr marL="2057400" indent="-228600" algn="l" defTabSz="914400" rtl="0" eaLnBrk="1" latinLnBrk="0" hangingPunct="1">
+              <a:lnSpc>
+                <a:spcPct val="90000"/>
+              </a:lnSpc>
+              <a:spcBef>
+                <a:spcPts val="500"/>
+              </a:spcBef>
+              <a:buFont typeface="Arial" panose="020B0604020202020204" pitchFamily="34" charset="0"/>
+              <a:buChar char="•"/>
+              <a:defRPr sz="1800" kern="1200">
+                <a:solidFill>
+                  <a:schemeClr val="tx1"/>
+                </a:solidFill>
+                <a:latin typeface="+mn-lt"/>
+                <a:ea typeface="+mn-ea"/>
+                <a:cs typeface="+mn-cs"/>
+              </a:defRPr>
+            </a:lvl5pPr>
+            <a:lvl6pPr marL="2514600" indent="-228600" algn="l" defTabSz="914400" rtl="0" eaLnBrk="1" latinLnBrk="0" hangingPunct="1">
+              <a:lnSpc>
+                <a:spcPct val="90000"/>
+              </a:lnSpc>
+              <a:spcBef>
+                <a:spcPts val="500"/>
+              </a:spcBef>
+              <a:buFont typeface="Arial" panose="020B0604020202020204" pitchFamily="34" charset="0"/>
+              <a:buChar char="•"/>
+              <a:defRPr sz="1800" kern="1200">
+                <a:solidFill>
+                  <a:schemeClr val="tx1"/>
+                </a:solidFill>
+                <a:latin typeface="+mn-lt"/>
+                <a:ea typeface="+mn-ea"/>
+                <a:cs typeface="+mn-cs"/>
+              </a:defRPr>
+            </a:lvl6pPr>
+            <a:lvl7pPr marL="2971800" indent="-228600" algn="l" defTabSz="914400" rtl="0" eaLnBrk="1" latinLnBrk="0" hangingPunct="1">
+              <a:lnSpc>
+                <a:spcPct val="90000"/>
+              </a:lnSpc>
+              <a:spcBef>
+                <a:spcPts val="500"/>
+              </a:spcBef>
+              <a:buFont typeface="Arial" panose="020B0604020202020204" pitchFamily="34" charset="0"/>
+              <a:buChar char="•"/>
+              <a:defRPr sz="1800" kern="1200">
+                <a:solidFill>
+                  <a:schemeClr val="tx1"/>
+                </a:solidFill>
+                <a:latin typeface="+mn-lt"/>
+                <a:ea typeface="+mn-ea"/>
+                <a:cs typeface="+mn-cs"/>
+              </a:defRPr>
+            </a:lvl7pPr>
+            <a:lvl8pPr marL="3429000" indent="-228600" algn="l" defTabSz="914400" rtl="0" eaLnBrk="1" latinLnBrk="0" hangingPunct="1">
+              <a:lnSpc>
+                <a:spcPct val="90000"/>
+              </a:lnSpc>
+              <a:spcBef>
+                <a:spcPts val="500"/>
+              </a:spcBef>
+              <a:buFont typeface="Arial" panose="020B0604020202020204" pitchFamily="34" charset="0"/>
+              <a:buChar char="•"/>
+              <a:defRPr sz="1800" kern="1200">
+                <a:solidFill>
+                  <a:schemeClr val="tx1"/>
+                </a:solidFill>
+                <a:latin typeface="+mn-lt"/>
+                <a:ea typeface="+mn-ea"/>
+                <a:cs typeface="+mn-cs"/>
+              </a:defRPr>
+            </a:lvl8pPr>
+            <a:lvl9pPr marL="3886200" indent="-228600" algn="l" defTabSz="914400" rtl="0" eaLnBrk="1" latinLnBrk="0" hangingPunct="1">
+              <a:lnSpc>
+                <a:spcPct val="90000"/>
+              </a:lnSpc>
+              <a:spcBef>
+                <a:spcPts val="500"/>
+              </a:spcBef>
+              <a:buFont typeface="Arial" panose="020B0604020202020204" pitchFamily="34" charset="0"/>
+              <a:buChar char="•"/>
+              <a:defRPr sz="1800" kern="1200">
+                <a:solidFill>
+                  <a:schemeClr val="tx1"/>
+                </a:solidFill>
+                <a:latin typeface="+mn-lt"/>
+                <a:ea typeface="+mn-ea"/>
+                <a:cs typeface="+mn-cs"/>
+              </a:defRPr>
+            </a:lvl9pPr>
+          </a:lstStyle>
+          <a:p>
+            <a:r>
+              <a:rPr lang="en-US" dirty="0"/>
+              <a:t>Personality traits are predictable from images, demonstrating correlation between personality and profile picture.</a:t>
+            </a:r>
+          </a:p>
+          <a:p>
+            <a:r>
+              <a:rPr lang="en-US" dirty="0"/>
+              <a:t>features of the models provide no interpretability and thus are not useful for psychologists who wish to understand the underlying correlations and generate hypotheses for further testing.</a:t>
+            </a:r>
+          </a:p>
+          <a:p>
+            <a:r>
+              <a:rPr lang="en-US" dirty="0"/>
+              <a:t>Data set was very limited size and user diversity</a:t>
+            </a:r>
+          </a:p>
+          <a:p>
+            <a:endParaRPr lang="en-US" dirty="0"/>
+          </a:p>
+        </p:txBody>
+      </p:sp>
+    </p:spTree>
+    <p:extLst>
+      <p:ext uri="{BB962C8B-B14F-4D97-AF65-F5344CB8AC3E}">
+        <p14:creationId xmlns:p14="http://schemas.microsoft.com/office/powerpoint/2010/main" val="140026054"/>
+      </p:ext>
+    </p:extLst>
+  </p:cSld>
+  <p:clrMapOvr>
+    <a:masterClrMapping/>
+  </p:clrMapOvr>
+</p:sld>
+</file>
+
+<file path=ppt/slides/slide8.xml><?xml version="1.0" encoding="utf-8"?>
+<p:sld xmlns:a="http://schemas.openxmlformats.org/drawingml/2006/main" xmlns:r="http://schemas.openxmlformats.org/officeDocument/2006/relationships" xmlns:p="http://schemas.openxmlformats.org/presentationml/2006/main">
+  <p:cSld>
+    <p:spTree>
+      <p:nvGrpSpPr>
+        <p:cNvPr id="1" name=""/>
+        <p:cNvGrpSpPr/>
+        <p:nvPr/>
+      </p:nvGrpSpPr>
+      <p:grpSpPr>
+        <a:xfrm>
+          <a:off x="0" y="0"/>
+          <a:ext cx="0" cy="0"/>
+          <a:chOff x="0" y="0"/>
+          <a:chExt cx="0" cy="0"/>
+        </a:xfrm>
+      </p:grpSpPr>
+      <p:sp>
+        <p:nvSpPr>
+          <p:cNvPr id="2" name="Title 1"/>
+          <p:cNvSpPr>
+            <a:spLocks noGrp="1"/>
+          </p:cNvSpPr>
+          <p:nvPr>
+            <p:ph type="title"/>
+          </p:nvPr>
+        </p:nvSpPr>
+        <p:spPr>
+          <a:xfrm>
+            <a:off x="838200" y="365125"/>
+            <a:ext cx="10515600" cy="1006475"/>
+          </a:xfrm>
+        </p:spPr>
+        <p:txBody>
+          <a:bodyPr/>
+          <a:lstStyle/>
+          <a:p>
+            <a:r>
+              <a:rPr lang="en-US" b="1" dirty="0"/>
+              <a:t>Related Work</a:t>
+            </a:r>
+          </a:p>
+        </p:txBody>
+      </p:sp>
+      <p:sp>
+        <p:nvSpPr>
+          <p:cNvPr id="3" name="Content Placeholder 2"/>
+          <p:cNvSpPr>
+            <a:spLocks noGrp="1"/>
+          </p:cNvSpPr>
+          <p:nvPr>
+            <p:ph idx="1"/>
+          </p:nvPr>
+        </p:nvSpPr>
+        <p:spPr>
+          <a:xfrm>
+            <a:off x="838200" y="1550894"/>
+            <a:ext cx="10515600" cy="4626069"/>
+          </a:xfrm>
+        </p:spPr>
+        <p:txBody>
+          <a:bodyPr/>
+          <a:lstStyle/>
+          <a:p>
+            <a:r>
+              <a:rPr lang="en-US" dirty="0"/>
+              <a:t>Most studies in psychology focused on facial expressions  as people frequently use facial characteristics for personality attributions, while some studies consider pose of person</a:t>
+            </a:r>
+          </a:p>
+        </p:txBody>
+      </p:sp>
+    </p:spTree>
+    <p:extLst>
+      <p:ext uri="{BB962C8B-B14F-4D97-AF65-F5344CB8AC3E}">
+        <p14:creationId xmlns:p14="http://schemas.microsoft.com/office/powerpoint/2010/main" val="2446853622"/>
+      </p:ext>
+    </p:extLst>
+  </p:cSld>
+  <p:clrMapOvr>
+    <a:masterClrMapping/>
+  </p:clrMapOvr>
+</p:sld>
+</file>
+
+<file path=ppt/slides/slide9.xml><?xml version="1.0" encoding="utf-8"?>
+<p:sld xmlns:a="http://schemas.openxmlformats.org/drawingml/2006/main" xmlns:r="http://schemas.openxmlformats.org/officeDocument/2006/relationships" xmlns:p="http://schemas.openxmlformats.org/presentationml/2006/main">
+  <p:cSld>
+    <p:spTree>
+      <p:nvGrpSpPr>
+        <p:cNvPr id="1" name=""/>
+        <p:cNvGrpSpPr/>
+        <p:nvPr/>
+      </p:nvGrpSpPr>
+      <p:grpSpPr>
+        <a:xfrm>
+          <a:off x="0" y="0"/>
+          <a:ext cx="0" cy="0"/>
+          <a:chOff x="0" y="0"/>
+          <a:chExt cx="0" cy="0"/>
+        </a:xfrm>
+      </p:grpSpPr>
+      <p:graphicFrame>
+        <p:nvGraphicFramePr>
+          <p:cNvPr id="8" name="Table 7"/>
+          <p:cNvGraphicFramePr>
+            <a:graphicFrameLocks noGrp="1"/>
+          </p:cNvGraphicFramePr>
+          <p:nvPr>
+            <p:extLst>
+              <p:ext uri="{D42A27DB-BD31-4B8C-83A1-F6EECF244321}">
+                <p14:modId xmlns:p14="http://schemas.microsoft.com/office/powerpoint/2010/main" val="191596365"/>
+              </p:ext>
+            </p:extLst>
+          </p:nvPr>
+        </p:nvGraphicFramePr>
+        <p:xfrm>
+          <a:off x="364564" y="459687"/>
+          <a:ext cx="11316448" cy="3404903"/>
+        </p:xfrm>
+        <a:graphic>
+          <a:graphicData uri="http://schemas.openxmlformats.org/drawingml/2006/table">
+            <a:tbl>
+              <a:tblPr firstRow="1" bandRow="1">
+                <a:tableStyleId>{5C22544A-7EE6-4342-B048-85BDC9FD1C3A}</a:tableStyleId>
+              </a:tblPr>
+              <a:tblGrid>
+                <a:gridCol w="5658224">
+                  <a:extLst>
+                    <a:ext uri="{9D8B030D-6E8A-4147-A177-3AD203B41FA5}">
+                      <a16:colId xmlns:a16="http://schemas.microsoft.com/office/drawing/2014/main" val="1786249240"/>
+                    </a:ext>
+                  </a:extLst>
+                </a:gridCol>
+                <a:gridCol w="5658224">
+                  <a:extLst>
+                    <a:ext uri="{9D8B030D-6E8A-4147-A177-3AD203B41FA5}">
+                      <a16:colId xmlns:a16="http://schemas.microsoft.com/office/drawing/2014/main" val="1506598637"/>
+                    </a:ext>
+                  </a:extLst>
+                </a:gridCol>
+              </a:tblGrid>
+              <a:tr h="370334">
+                <a:tc>
+                  <a:txBody>
+                    <a:bodyPr/>
+                    <a:lstStyle/>
+                    <a:p>
+                      <a:r>
+                        <a:rPr lang="en-US" dirty="0"/>
+                        <a:t>Strength</a:t>
+                      </a:r>
+                    </a:p>
+                  </a:txBody>
+                  <a:tcPr/>
+                </a:tc>
+                <a:tc>
+                  <a:txBody>
+                    <a:bodyPr/>
+                    <a:lstStyle/>
+                    <a:p>
+                      <a:r>
+                        <a:rPr lang="en-US" dirty="0" err="1"/>
+                        <a:t>Weekness</a:t>
+                      </a:r>
+                      <a:endParaRPr lang="en-US" dirty="0"/>
+                    </a:p>
+                  </a:txBody>
+                  <a:tcPr/>
+                </a:tc>
+                <a:extLst>
+                  <a:ext uri="{0D108BD9-81ED-4DB2-BD59-A6C34878D82A}">
+                    <a16:rowId xmlns:a16="http://schemas.microsoft.com/office/drawing/2014/main" val="1392765590"/>
+                  </a:ext>
+                </a:extLst>
+              </a:tr>
+              <a:tr h="913153">
+                <a:tc>
+                  <a:txBody>
+                    <a:bodyPr/>
+                    <a:lstStyle/>
+                    <a:p>
+                      <a:r>
+                        <a:rPr lang="en-US" dirty="0"/>
+                        <a:t>Used great example to explain the correlation between personality traits and profile picture</a:t>
+                      </a:r>
+                    </a:p>
+                  </a:txBody>
+                  <a:tcPr/>
+                </a:tc>
+                <a:tc>
+                  <a:txBody>
+                    <a:bodyPr/>
+                    <a:lstStyle/>
+                    <a:p>
+                      <a:endParaRPr lang="en-US" dirty="0"/>
+                    </a:p>
+                  </a:txBody>
+                  <a:tcPr/>
+                </a:tc>
+                <a:extLst>
+                  <a:ext uri="{0D108BD9-81ED-4DB2-BD59-A6C34878D82A}">
+                    <a16:rowId xmlns:a16="http://schemas.microsoft.com/office/drawing/2014/main" val="2444509016"/>
+                  </a:ext>
+                </a:extLst>
+              </a:tr>
+              <a:tr h="370334">
+                <a:tc>
+                  <a:txBody>
+                    <a:bodyPr/>
+                    <a:lstStyle/>
+                    <a:p>
+                      <a:r>
+                        <a:rPr lang="en-US" dirty="0"/>
+                        <a:t>Overcame the problem of previous work by taking 60000 users</a:t>
+                      </a:r>
+                    </a:p>
+                  </a:txBody>
+                  <a:tcPr/>
+                </a:tc>
+                <a:tc>
+                  <a:txBody>
+                    <a:bodyPr/>
+                    <a:lstStyle/>
+                    <a:p>
+                      <a:endParaRPr lang="en-US"/>
+                    </a:p>
+                  </a:txBody>
+                  <a:tcPr/>
+                </a:tc>
+                <a:extLst>
+                  <a:ext uri="{0D108BD9-81ED-4DB2-BD59-A6C34878D82A}">
+                    <a16:rowId xmlns:a16="http://schemas.microsoft.com/office/drawing/2014/main" val="3695957096"/>
+                  </a:ext>
+                </a:extLst>
+              </a:tr>
+              <a:tr h="370334">
+                <a:tc>
+                  <a:txBody>
+                    <a:bodyPr/>
+                    <a:lstStyle/>
+                    <a:p>
+                      <a:endParaRPr lang="en-US"/>
+                    </a:p>
+                  </a:txBody>
+                  <a:tcPr/>
+                </a:tc>
+                <a:tc>
+                  <a:txBody>
+                    <a:bodyPr/>
+                    <a:lstStyle/>
+                    <a:p>
+                      <a:endParaRPr lang="en-US"/>
+                    </a:p>
+                  </a:txBody>
+                  <a:tcPr/>
+                </a:tc>
+                <a:extLst>
+                  <a:ext uri="{0D108BD9-81ED-4DB2-BD59-A6C34878D82A}">
+                    <a16:rowId xmlns:a16="http://schemas.microsoft.com/office/drawing/2014/main" val="1921710813"/>
+                  </a:ext>
+                </a:extLst>
+              </a:tr>
+              <a:tr h="370334">
+                <a:tc>
+                  <a:txBody>
+                    <a:bodyPr/>
+                    <a:lstStyle/>
+                    <a:p>
+                      <a:endParaRPr lang="en-US"/>
+                    </a:p>
+                  </a:txBody>
+                  <a:tcPr/>
+                </a:tc>
+                <a:tc>
+                  <a:txBody>
+                    <a:bodyPr/>
+                    <a:lstStyle/>
+                    <a:p>
+                      <a:endParaRPr lang="en-US"/>
+                    </a:p>
+                  </a:txBody>
+                  <a:tcPr/>
+                </a:tc>
+                <a:extLst>
+                  <a:ext uri="{0D108BD9-81ED-4DB2-BD59-A6C34878D82A}">
+                    <a16:rowId xmlns:a16="http://schemas.microsoft.com/office/drawing/2014/main" val="2799151686"/>
+                  </a:ext>
+                </a:extLst>
+              </a:tr>
+              <a:tr h="370334">
+                <a:tc>
+                  <a:txBody>
+                    <a:bodyPr/>
+                    <a:lstStyle/>
+                    <a:p>
+                      <a:endParaRPr lang="en-US"/>
+                    </a:p>
+                  </a:txBody>
+                  <a:tcPr/>
+                </a:tc>
+                <a:tc>
+                  <a:txBody>
+                    <a:bodyPr/>
+                    <a:lstStyle/>
+                    <a:p>
+                      <a:endParaRPr lang="en-US"/>
+                    </a:p>
+                  </a:txBody>
+                  <a:tcPr/>
+                </a:tc>
+                <a:extLst>
+                  <a:ext uri="{0D108BD9-81ED-4DB2-BD59-A6C34878D82A}">
+                    <a16:rowId xmlns:a16="http://schemas.microsoft.com/office/drawing/2014/main" val="2175883719"/>
+                  </a:ext>
+                </a:extLst>
+              </a:tr>
+              <a:tr h="370334">
+                <a:tc>
+                  <a:txBody>
+                    <a:bodyPr/>
+                    <a:lstStyle/>
+                    <a:p>
+                      <a:endParaRPr lang="en-US" dirty="0"/>
+                    </a:p>
+                  </a:txBody>
+                  <a:tcPr/>
+                </a:tc>
+                <a:tc>
+                  <a:txBody>
+                    <a:bodyPr/>
+                    <a:lstStyle/>
+                    <a:p>
+                      <a:endParaRPr lang="en-US" dirty="0"/>
+                    </a:p>
+                  </a:txBody>
+                  <a:tcPr/>
+                </a:tc>
+                <a:extLst>
+                  <a:ext uri="{0D108BD9-81ED-4DB2-BD59-A6C34878D82A}">
+                    <a16:rowId xmlns:a16="http://schemas.microsoft.com/office/drawing/2014/main" val="3604259120"/>
+                  </a:ext>
+                </a:extLst>
+              </a:tr>
+            </a:tbl>
+          </a:graphicData>
+        </a:graphic>
+      </p:graphicFrame>
+    </p:spTree>
+    <p:extLst>
+      <p:ext uri="{BB962C8B-B14F-4D97-AF65-F5344CB8AC3E}">
+        <p14:creationId xmlns:p14="http://schemas.microsoft.com/office/powerpoint/2010/main" val="2335679282"/>
       </p:ext>
     </p:extLst>
   </p:cSld>

</xml_diff>